<commit_message>
update presentation, booking fail
</commit_message>
<xml_diff>
--- a/presentation/eva_.pptx
+++ b/presentation/eva_.pptx
@@ -391,7 +391,7 @@
             <a:fld id="{B61BEF0D-F0BB-DE4B-95CE-6DB70DBA9567}" type="datetimeFigureOut">
               <a:rPr lang="en-US" smtClean="0"/>
               <a:pPr/>
-              <a:t>9/16/2016</a:t>
+              <a:t>9/16/16</a:t>
             </a:fld>
             <a:endParaRPr lang="en-US" dirty="0"/>
           </a:p>
@@ -605,7 +605,7 @@
           <a:p>
             <a:fld id="{55C6B4A9-1611-4792-9094-5F34BCA07E0B}" type="datetimeFigureOut">
               <a:rPr lang="en-US" smtClean="0"/>
-              <a:t>9/16/2016</a:t>
+              <a:t>9/16/16</a:t>
             </a:fld>
             <a:endParaRPr lang="en-US" dirty="0"/>
           </a:p>
@@ -862,7 +862,7 @@
             <a:fld id="{B61BEF0D-F0BB-DE4B-95CE-6DB70DBA9567}" type="datetimeFigureOut">
               <a:rPr lang="en-US" smtClean="0"/>
               <a:pPr/>
-              <a:t>9/16/2016</a:t>
+              <a:t>9/16/16</a:t>
             </a:fld>
             <a:endParaRPr lang="en-US" dirty="0"/>
           </a:p>
@@ -1039,7 +1039,7 @@
             <a:fld id="{B61BEF0D-F0BB-DE4B-95CE-6DB70DBA9567}" type="datetimeFigureOut">
               <a:rPr lang="en-US" smtClean="0"/>
               <a:pPr/>
-              <a:t>9/16/2016</a:t>
+              <a:t>9/16/16</a:t>
             </a:fld>
             <a:endParaRPr lang="en-US" dirty="0"/>
           </a:p>
@@ -1384,7 +1384,7 @@
             <a:fld id="{B61BEF0D-F0BB-DE4B-95CE-6DB70DBA9567}" type="datetimeFigureOut">
               <a:rPr lang="en-US" smtClean="0"/>
               <a:pPr/>
-              <a:t>9/16/2016</a:t>
+              <a:t>9/16/16</a:t>
             </a:fld>
             <a:endParaRPr lang="en-US" dirty="0"/>
           </a:p>
@@ -1665,7 +1665,7 @@
           <a:p>
             <a:fld id="{EB712588-04B1-427B-82EE-E8DB90309F08}" type="datetimeFigureOut">
               <a:rPr lang="en-US" smtClean="0"/>
-              <a:t>9/16/2016</a:t>
+              <a:t>9/16/16</a:t>
             </a:fld>
             <a:endParaRPr lang="en-US" dirty="0"/>
           </a:p>
@@ -2045,7 +2045,7 @@
             <a:fld id="{B61BEF0D-F0BB-DE4B-95CE-6DB70DBA9567}" type="datetimeFigureOut">
               <a:rPr lang="en-US" smtClean="0"/>
               <a:pPr/>
-              <a:t>9/16/2016</a:t>
+              <a:t>9/16/16</a:t>
             </a:fld>
             <a:endParaRPr lang="en-US" dirty="0"/>
           </a:p>
@@ -2165,7 +2165,7 @@
             <a:fld id="{B61BEF0D-F0BB-DE4B-95CE-6DB70DBA9567}" type="datetimeFigureOut">
               <a:rPr lang="en-US" smtClean="0"/>
               <a:pPr/>
-              <a:t>9/16/2016</a:t>
+              <a:t>9/16/16</a:t>
             </a:fld>
             <a:endParaRPr lang="en-US" dirty="0"/>
           </a:p>
@@ -2338,7 +2338,7 @@
             <a:fld id="{B61BEF0D-F0BB-DE4B-95CE-6DB70DBA9567}" type="datetimeFigureOut">
               <a:rPr lang="en-US" smtClean="0"/>
               <a:pPr/>
-              <a:t>9/16/2016</a:t>
+              <a:t>9/16/16</a:t>
             </a:fld>
             <a:endParaRPr lang="en-US" dirty="0"/>
           </a:p>
@@ -2693,7 +2693,7 @@
           <a:p>
             <a:fld id="{42A54C80-263E-416B-A8E0-580EDEADCBDC}" type="datetimeFigureOut">
               <a:rPr lang="en-US" smtClean="0"/>
-              <a:t>9/16/2016</a:t>
+              <a:t>9/16/16</a:t>
             </a:fld>
             <a:endParaRPr lang="en-US" dirty="0"/>
           </a:p>
@@ -3071,7 +3071,7 @@
             <a:fld id="{B61BEF0D-F0BB-DE4B-95CE-6DB70DBA9567}" type="datetimeFigureOut">
               <a:rPr lang="en-US" smtClean="0"/>
               <a:pPr/>
-              <a:t>9/16/2016</a:t>
+              <a:t>9/16/16</a:t>
             </a:fld>
             <a:endParaRPr lang="en-US" dirty="0"/>
           </a:p>
@@ -3360,7 +3360,7 @@
             <a:fld id="{B61BEF0D-F0BB-DE4B-95CE-6DB70DBA9567}" type="datetimeFigureOut">
               <a:rPr lang="en-US" smtClean="0"/>
               <a:pPr/>
-              <a:t>9/16/2016</a:t>
+              <a:t>9/16/16</a:t>
             </a:fld>
             <a:endParaRPr lang="en-US" dirty="0"/>
           </a:p>
@@ -4076,6 +4076,13 @@
   <p:clrMapOvr>
     <a:masterClrMapping/>
   </p:clrMapOvr>
+  <p:timing>
+    <p:tnLst>
+      <p:par>
+        <p:cTn id="1" dur="indefinite" restart="never" nodeType="tmRoot"/>
+      </p:par>
+    </p:tnLst>
+  </p:timing>
 </p:sld>
 </file>
 
@@ -5245,6 +5252,13 @@
   <p:clrMapOvr>
     <a:masterClrMapping/>
   </p:clrMapOvr>
+  <p:timing>
+    <p:tnLst>
+      <p:par>
+        <p:cTn id="1" dur="indefinite" restart="never" nodeType="tmRoot"/>
+      </p:par>
+    </p:tnLst>
+  </p:timing>
 </p:sld>
 </file>
 
@@ -5855,6 +5869,13 @@
   <p:clrMapOvr>
     <a:masterClrMapping/>
   </p:clrMapOvr>
+  <p:timing>
+    <p:tnLst>
+      <p:par>
+        <p:cTn id="1" dur="indefinite" restart="never" nodeType="tmRoot"/>
+      </p:par>
+    </p:tnLst>
+  </p:timing>
 </p:sld>
 </file>
 
@@ -8645,6 +8666,13 @@
       </p:transition>
     </mc:Fallback>
   </mc:AlternateContent>
+  <p:timing>
+    <p:tnLst>
+      <p:par>
+        <p:cTn id="1" dur="indefinite" restart="never" nodeType="tmRoot"/>
+      </p:par>
+    </p:tnLst>
+  </p:timing>
 </p:sld>
 </file>
 
@@ -13217,6 +13245,13 @@
   <p:clrMapOvr>
     <a:masterClrMapping/>
   </p:clrMapOvr>
+  <p:timing>
+    <p:tnLst>
+      <p:par>
+        <p:cTn id="1" dur="indefinite" restart="never" nodeType="tmRoot"/>
+      </p:par>
+    </p:tnLst>
+  </p:timing>
 </p:sld>
 </file>
 
@@ -13364,6 +13399,13 @@
   <p:clrMapOvr>
     <a:masterClrMapping/>
   </p:clrMapOvr>
+  <p:timing>
+    <p:tnLst>
+      <p:par>
+        <p:cTn id="1" dur="indefinite" restart="never" nodeType="tmRoot"/>
+      </p:par>
+    </p:tnLst>
+  </p:timing>
 </p:sld>
 </file>
 
@@ -13555,36 +13597,6 @@
           </a:xfrm>
         </p:spPr>
       </p:pic>
-      <p:pic>
-        <p:nvPicPr>
-          <p:cNvPr id="14" name="Bild 13"/>
-          <p:cNvPicPr>
-            <a:picLocks noChangeAspect="1"/>
-          </p:cNvPicPr>
-          <p:nvPr/>
-        </p:nvPicPr>
-        <p:blipFill>
-          <a:blip r:embed="rId4">
-            <a:extLst>
-              <a:ext uri="{28A0092B-C50C-407E-A947-70E740481C1C}">
-                <a14:useLocalDpi xmlns:a14="http://schemas.microsoft.com/office/drawing/2010/main" val="0"/>
-              </a:ext>
-            </a:extLst>
-          </a:blip>
-          <a:stretch>
-            <a:fillRect/>
-          </a:stretch>
-        </p:blipFill>
-        <p:spPr>
-          <a:xfrm>
-            <a:off x="914400" y="2997200"/>
-            <a:ext cx="7302500" cy="863600"/>
-          </a:xfrm>
-          <a:prstGeom prst="rect">
-            <a:avLst/>
-          </a:prstGeom>
-        </p:spPr>
-      </p:pic>
     </p:spTree>
     <p:extLst>
       <p:ext uri="{BB962C8B-B14F-4D97-AF65-F5344CB8AC3E}">
@@ -13595,6 +13607,479 @@
   <p:clrMapOvr>
     <a:masterClrMapping/>
   </p:clrMapOvr>
+  <p:timing>
+    <p:tnLst>
+      <p:par>
+        <p:cTn id="1" dur="indefinite" restart="never" nodeType="tmRoot">
+          <p:childTnLst>
+            <p:seq concurrent="1" nextAc="seek">
+              <p:cTn id="2" dur="indefinite" nodeType="mainSeq">
+                <p:childTnLst>
+                  <p:par>
+                    <p:cTn id="3" fill="hold">
+                      <p:stCondLst>
+                        <p:cond delay="indefinite"/>
+                      </p:stCondLst>
+                      <p:childTnLst>
+                        <p:par>
+                          <p:cTn id="4" fill="hold">
+                            <p:stCondLst>
+                              <p:cond delay="0"/>
+                            </p:stCondLst>
+                            <p:childTnLst>
+                              <p:par>
+                                <p:cTn id="5" presetID="1" presetClass="entr" presetSubtype="0" fill="hold" grpId="0" nodeType="clickEffect">
+                                  <p:stCondLst>
+                                    <p:cond delay="0"/>
+                                  </p:stCondLst>
+                                  <p:childTnLst>
+                                    <p:set>
+                                      <p:cBhvr>
+                                        <p:cTn id="6" dur="1" fill="hold">
+                                          <p:stCondLst>
+                                            <p:cond delay="0"/>
+                                          </p:stCondLst>
+                                        </p:cTn>
+                                        <p:tgtEl>
+                                          <p:spTgt spid="3">
+                                            <p:txEl>
+                                              <p:pRg st="0" end="0"/>
+                                            </p:txEl>
+                                          </p:spTgt>
+                                        </p:tgtEl>
+                                        <p:attrNameLst>
+                                          <p:attrName>style.visibility</p:attrName>
+                                        </p:attrNameLst>
+                                      </p:cBhvr>
+                                      <p:to>
+                                        <p:strVal val="visible"/>
+                                      </p:to>
+                                    </p:set>
+                                  </p:childTnLst>
+                                </p:cTn>
+                              </p:par>
+                              <p:par>
+                                <p:cTn id="7" presetID="2" presetClass="entr" presetSubtype="2" fill="hold" nodeType="withEffect">
+                                  <p:stCondLst>
+                                    <p:cond delay="0"/>
+                                  </p:stCondLst>
+                                  <p:childTnLst>
+                                    <p:set>
+                                      <p:cBhvr>
+                                        <p:cTn id="8" dur="1" fill="hold">
+                                          <p:stCondLst>
+                                            <p:cond delay="0"/>
+                                          </p:stCondLst>
+                                        </p:cTn>
+                                        <p:tgtEl>
+                                          <p:spTgt spid="10"/>
+                                        </p:tgtEl>
+                                        <p:attrNameLst>
+                                          <p:attrName>style.visibility</p:attrName>
+                                        </p:attrNameLst>
+                                      </p:cBhvr>
+                                      <p:to>
+                                        <p:strVal val="visible"/>
+                                      </p:to>
+                                    </p:set>
+                                    <p:anim calcmode="lin" valueType="num">
+                                      <p:cBhvr additive="base">
+                                        <p:cTn id="9" dur="500" fill="hold"/>
+                                        <p:tgtEl>
+                                          <p:spTgt spid="10"/>
+                                        </p:tgtEl>
+                                        <p:attrNameLst>
+                                          <p:attrName>ppt_x</p:attrName>
+                                        </p:attrNameLst>
+                                      </p:cBhvr>
+                                      <p:tavLst>
+                                        <p:tav tm="0">
+                                          <p:val>
+                                            <p:strVal val="1+#ppt_w/2"/>
+                                          </p:val>
+                                        </p:tav>
+                                        <p:tav tm="100000">
+                                          <p:val>
+                                            <p:strVal val="#ppt_x"/>
+                                          </p:val>
+                                        </p:tav>
+                                      </p:tavLst>
+                                    </p:anim>
+                                    <p:anim calcmode="lin" valueType="num">
+                                      <p:cBhvr additive="base">
+                                        <p:cTn id="10" dur="500" fill="hold"/>
+                                        <p:tgtEl>
+                                          <p:spTgt spid="10"/>
+                                        </p:tgtEl>
+                                        <p:attrNameLst>
+                                          <p:attrName>ppt_y</p:attrName>
+                                        </p:attrNameLst>
+                                      </p:cBhvr>
+                                      <p:tavLst>
+                                        <p:tav tm="0">
+                                          <p:val>
+                                            <p:strVal val="#ppt_y"/>
+                                          </p:val>
+                                        </p:tav>
+                                        <p:tav tm="100000">
+                                          <p:val>
+                                            <p:strVal val="#ppt_y"/>
+                                          </p:val>
+                                        </p:tav>
+                                      </p:tavLst>
+                                    </p:anim>
+                                  </p:childTnLst>
+                                </p:cTn>
+                              </p:par>
+                            </p:childTnLst>
+                          </p:cTn>
+                        </p:par>
+                      </p:childTnLst>
+                    </p:cTn>
+                  </p:par>
+                  <p:par>
+                    <p:cTn id="11" fill="hold">
+                      <p:stCondLst>
+                        <p:cond delay="indefinite"/>
+                      </p:stCondLst>
+                      <p:childTnLst>
+                        <p:par>
+                          <p:cTn id="12" fill="hold">
+                            <p:stCondLst>
+                              <p:cond delay="0"/>
+                            </p:stCondLst>
+                            <p:childTnLst>
+                              <p:par>
+                                <p:cTn id="13" presetID="1" presetClass="entr" presetSubtype="0" fill="hold" grpId="0" nodeType="clickEffect">
+                                  <p:stCondLst>
+                                    <p:cond delay="0"/>
+                                  </p:stCondLst>
+                                  <p:childTnLst>
+                                    <p:set>
+                                      <p:cBhvr>
+                                        <p:cTn id="14" dur="1" fill="hold">
+                                          <p:stCondLst>
+                                            <p:cond delay="0"/>
+                                          </p:stCondLst>
+                                        </p:cTn>
+                                        <p:tgtEl>
+                                          <p:spTgt spid="3">
+                                            <p:txEl>
+                                              <p:pRg st="1" end="1"/>
+                                            </p:txEl>
+                                          </p:spTgt>
+                                        </p:tgtEl>
+                                        <p:attrNameLst>
+                                          <p:attrName>style.visibility</p:attrName>
+                                        </p:attrNameLst>
+                                      </p:cBhvr>
+                                      <p:to>
+                                        <p:strVal val="visible"/>
+                                      </p:to>
+                                    </p:set>
+                                  </p:childTnLst>
+                                </p:cTn>
+                              </p:par>
+                            </p:childTnLst>
+                          </p:cTn>
+                        </p:par>
+                      </p:childTnLst>
+                    </p:cTn>
+                  </p:par>
+                  <p:par>
+                    <p:cTn id="15" fill="hold">
+                      <p:stCondLst>
+                        <p:cond delay="indefinite"/>
+                      </p:stCondLst>
+                      <p:childTnLst>
+                        <p:par>
+                          <p:cTn id="16" fill="hold">
+                            <p:stCondLst>
+                              <p:cond delay="0"/>
+                            </p:stCondLst>
+                            <p:childTnLst>
+                              <p:par>
+                                <p:cTn id="17" presetID="1" presetClass="entr" presetSubtype="0" fill="hold" grpId="0" nodeType="clickEffect">
+                                  <p:stCondLst>
+                                    <p:cond delay="0"/>
+                                  </p:stCondLst>
+                                  <p:childTnLst>
+                                    <p:set>
+                                      <p:cBhvr>
+                                        <p:cTn id="18" dur="1" fill="hold">
+                                          <p:stCondLst>
+                                            <p:cond delay="0"/>
+                                          </p:stCondLst>
+                                        </p:cTn>
+                                        <p:tgtEl>
+                                          <p:spTgt spid="3">
+                                            <p:txEl>
+                                              <p:pRg st="2" end="2"/>
+                                            </p:txEl>
+                                          </p:spTgt>
+                                        </p:tgtEl>
+                                        <p:attrNameLst>
+                                          <p:attrName>style.visibility</p:attrName>
+                                        </p:attrNameLst>
+                                      </p:cBhvr>
+                                      <p:to>
+                                        <p:strVal val="visible"/>
+                                      </p:to>
+                                    </p:set>
+                                  </p:childTnLst>
+                                </p:cTn>
+                              </p:par>
+                            </p:childTnLst>
+                          </p:cTn>
+                        </p:par>
+                      </p:childTnLst>
+                    </p:cTn>
+                  </p:par>
+                  <p:par>
+                    <p:cTn id="19" fill="hold">
+                      <p:stCondLst>
+                        <p:cond delay="indefinite"/>
+                      </p:stCondLst>
+                      <p:childTnLst>
+                        <p:par>
+                          <p:cTn id="20" fill="hold">
+                            <p:stCondLst>
+                              <p:cond delay="0"/>
+                            </p:stCondLst>
+                            <p:childTnLst>
+                              <p:par>
+                                <p:cTn id="21" presetID="1" presetClass="entr" presetSubtype="0" fill="hold" grpId="0" nodeType="clickEffect">
+                                  <p:stCondLst>
+                                    <p:cond delay="0"/>
+                                  </p:stCondLst>
+                                  <p:childTnLst>
+                                    <p:set>
+                                      <p:cBhvr>
+                                        <p:cTn id="22" dur="1" fill="hold">
+                                          <p:stCondLst>
+                                            <p:cond delay="0"/>
+                                          </p:stCondLst>
+                                        </p:cTn>
+                                        <p:tgtEl>
+                                          <p:spTgt spid="3">
+                                            <p:txEl>
+                                              <p:pRg st="3" end="3"/>
+                                            </p:txEl>
+                                          </p:spTgt>
+                                        </p:tgtEl>
+                                        <p:attrNameLst>
+                                          <p:attrName>style.visibility</p:attrName>
+                                        </p:attrNameLst>
+                                      </p:cBhvr>
+                                      <p:to>
+                                        <p:strVal val="visible"/>
+                                      </p:to>
+                                    </p:set>
+                                  </p:childTnLst>
+                                </p:cTn>
+                              </p:par>
+                            </p:childTnLst>
+                          </p:cTn>
+                        </p:par>
+                      </p:childTnLst>
+                    </p:cTn>
+                  </p:par>
+                  <p:par>
+                    <p:cTn id="23" fill="hold">
+                      <p:stCondLst>
+                        <p:cond delay="indefinite"/>
+                      </p:stCondLst>
+                      <p:childTnLst>
+                        <p:par>
+                          <p:cTn id="24" fill="hold">
+                            <p:stCondLst>
+                              <p:cond delay="0"/>
+                            </p:stCondLst>
+                            <p:childTnLst>
+                              <p:par>
+                                <p:cTn id="25" presetID="1" presetClass="entr" presetSubtype="0" fill="hold" grpId="0" nodeType="clickEffect">
+                                  <p:stCondLst>
+                                    <p:cond delay="0"/>
+                                  </p:stCondLst>
+                                  <p:childTnLst>
+                                    <p:set>
+                                      <p:cBhvr>
+                                        <p:cTn id="26" dur="1" fill="hold">
+                                          <p:stCondLst>
+                                            <p:cond delay="0"/>
+                                          </p:stCondLst>
+                                        </p:cTn>
+                                        <p:tgtEl>
+                                          <p:spTgt spid="3">
+                                            <p:txEl>
+                                              <p:pRg st="4" end="4"/>
+                                            </p:txEl>
+                                          </p:spTgt>
+                                        </p:tgtEl>
+                                        <p:attrNameLst>
+                                          <p:attrName>style.visibility</p:attrName>
+                                        </p:attrNameLst>
+                                      </p:cBhvr>
+                                      <p:to>
+                                        <p:strVal val="visible"/>
+                                      </p:to>
+                                    </p:set>
+                                  </p:childTnLst>
+                                </p:cTn>
+                              </p:par>
+                            </p:childTnLst>
+                          </p:cTn>
+                        </p:par>
+                      </p:childTnLst>
+                    </p:cTn>
+                  </p:par>
+                  <p:par>
+                    <p:cTn id="27" fill="hold">
+                      <p:stCondLst>
+                        <p:cond delay="indefinite"/>
+                      </p:stCondLst>
+                      <p:childTnLst>
+                        <p:par>
+                          <p:cTn id="28" fill="hold">
+                            <p:stCondLst>
+                              <p:cond delay="0"/>
+                            </p:stCondLst>
+                            <p:childTnLst>
+                              <p:par>
+                                <p:cTn id="29" presetID="1" presetClass="entr" presetSubtype="0" fill="hold" grpId="0" nodeType="clickEffect">
+                                  <p:stCondLst>
+                                    <p:cond delay="0"/>
+                                  </p:stCondLst>
+                                  <p:childTnLst>
+                                    <p:set>
+                                      <p:cBhvr>
+                                        <p:cTn id="30" dur="1" fill="hold">
+                                          <p:stCondLst>
+                                            <p:cond delay="0"/>
+                                          </p:stCondLst>
+                                        </p:cTn>
+                                        <p:tgtEl>
+                                          <p:spTgt spid="3">
+                                            <p:txEl>
+                                              <p:pRg st="5" end="5"/>
+                                            </p:txEl>
+                                          </p:spTgt>
+                                        </p:tgtEl>
+                                        <p:attrNameLst>
+                                          <p:attrName>style.visibility</p:attrName>
+                                        </p:attrNameLst>
+                                      </p:cBhvr>
+                                      <p:to>
+                                        <p:strVal val="visible"/>
+                                      </p:to>
+                                    </p:set>
+                                  </p:childTnLst>
+                                </p:cTn>
+                              </p:par>
+                              <p:par>
+                                <p:cTn id="31" presetID="2" presetClass="entr" presetSubtype="2" fill="hold" nodeType="withEffect">
+                                  <p:stCondLst>
+                                    <p:cond delay="0"/>
+                                  </p:stCondLst>
+                                  <p:childTnLst>
+                                    <p:set>
+                                      <p:cBhvr>
+                                        <p:cTn id="32" dur="1" fill="hold">
+                                          <p:stCondLst>
+                                            <p:cond delay="0"/>
+                                          </p:stCondLst>
+                                        </p:cTn>
+                                        <p:tgtEl>
+                                          <p:spTgt spid="12"/>
+                                        </p:tgtEl>
+                                        <p:attrNameLst>
+                                          <p:attrName>style.visibility</p:attrName>
+                                        </p:attrNameLst>
+                                      </p:cBhvr>
+                                      <p:to>
+                                        <p:strVal val="visible"/>
+                                      </p:to>
+                                    </p:set>
+                                    <p:anim calcmode="lin" valueType="num">
+                                      <p:cBhvr additive="base">
+                                        <p:cTn id="33" dur="500" fill="hold"/>
+                                        <p:tgtEl>
+                                          <p:spTgt spid="12"/>
+                                        </p:tgtEl>
+                                        <p:attrNameLst>
+                                          <p:attrName>ppt_x</p:attrName>
+                                        </p:attrNameLst>
+                                      </p:cBhvr>
+                                      <p:tavLst>
+                                        <p:tav tm="0">
+                                          <p:val>
+                                            <p:strVal val="1+#ppt_w/2"/>
+                                          </p:val>
+                                        </p:tav>
+                                        <p:tav tm="100000">
+                                          <p:val>
+                                            <p:strVal val="#ppt_x"/>
+                                          </p:val>
+                                        </p:tav>
+                                      </p:tavLst>
+                                    </p:anim>
+                                    <p:anim calcmode="lin" valueType="num">
+                                      <p:cBhvr additive="base">
+                                        <p:cTn id="34" dur="500" fill="hold"/>
+                                        <p:tgtEl>
+                                          <p:spTgt spid="12"/>
+                                        </p:tgtEl>
+                                        <p:attrNameLst>
+                                          <p:attrName>ppt_y</p:attrName>
+                                        </p:attrNameLst>
+                                      </p:cBhvr>
+                                      <p:tavLst>
+                                        <p:tav tm="0">
+                                          <p:val>
+                                            <p:strVal val="#ppt_y"/>
+                                          </p:val>
+                                        </p:tav>
+                                        <p:tav tm="100000">
+                                          <p:val>
+                                            <p:strVal val="#ppt_y"/>
+                                          </p:val>
+                                        </p:tav>
+                                      </p:tavLst>
+                                    </p:anim>
+                                  </p:childTnLst>
+                                </p:cTn>
+                              </p:par>
+                            </p:childTnLst>
+                          </p:cTn>
+                        </p:par>
+                      </p:childTnLst>
+                    </p:cTn>
+                  </p:par>
+                </p:childTnLst>
+              </p:cTn>
+              <p:prevCondLst>
+                <p:cond evt="onPrev" delay="0">
+                  <p:tgtEl>
+                    <p:sldTgt/>
+                  </p:tgtEl>
+                </p:cond>
+              </p:prevCondLst>
+              <p:nextCondLst>
+                <p:cond evt="onNext" delay="0">
+                  <p:tgtEl>
+                    <p:sldTgt/>
+                  </p:tgtEl>
+                </p:cond>
+              </p:nextCondLst>
+            </p:seq>
+          </p:childTnLst>
+        </p:cTn>
+      </p:par>
+    </p:tnLst>
+    <p:bldLst>
+      <p:bldP spid="3" grpId="0" uiExpand="1" build="p"/>
+    </p:bldLst>
+  </p:timing>
 </p:sld>
 </file>
 
@@ -14158,6 +14643,13 @@
   <p:clrMapOvr>
     <a:masterClrMapping/>
   </p:clrMapOvr>
+  <p:timing>
+    <p:tnLst>
+      <p:par>
+        <p:cTn id="1" dur="indefinite" restart="never" nodeType="tmRoot"/>
+      </p:par>
+    </p:tnLst>
+  </p:timing>
 </p:sld>
 </file>
 
@@ -14596,6 +15088,13 @@
   <p:clrMapOvr>
     <a:masterClrMapping/>
   </p:clrMapOvr>
+  <p:timing>
+    <p:tnLst>
+      <p:par>
+        <p:cTn id="1" dur="indefinite" restart="never" nodeType="tmRoot"/>
+      </p:par>
+    </p:tnLst>
+  </p:timing>
 </p:sld>
 </file>
 
@@ -14903,6 +15402,13 @@
   <p:clrMapOvr>
     <a:masterClrMapping/>
   </p:clrMapOvr>
+  <p:timing>
+    <p:tnLst>
+      <p:par>
+        <p:cTn id="1" dur="indefinite" restart="never" nodeType="tmRoot"/>
+      </p:par>
+    </p:tnLst>
+  </p:timing>
 </p:sld>
 </file>
 
@@ -15015,6 +15521,13 @@
   <p:clrMapOvr>
     <a:masterClrMapping/>
   </p:clrMapOvr>
+  <p:timing>
+    <p:tnLst>
+      <p:par>
+        <p:cTn id="1" dur="indefinite" restart="never" nodeType="tmRoot"/>
+      </p:par>
+    </p:tnLst>
+  </p:timing>
 </p:sld>
 </file>
 
@@ -15123,6 +15636,13 @@
   <p:clrMapOvr>
     <a:masterClrMapping/>
   </p:clrMapOvr>
+  <p:timing>
+    <p:tnLst>
+      <p:par>
+        <p:cTn id="1" dur="indefinite" restart="never" nodeType="tmRoot"/>
+      </p:par>
+    </p:tnLst>
+  </p:timing>
 </p:sld>
 </file>
 
@@ -17391,6 +17911,13 @@
   <p:clrMapOvr>
     <a:masterClrMapping/>
   </p:clrMapOvr>
+  <p:timing>
+    <p:tnLst>
+      <p:par>
+        <p:cTn id="1" dur="indefinite" restart="never" nodeType="tmRoot"/>
+      </p:par>
+    </p:tnLst>
+  </p:timing>
 </p:sld>
 </file>
 
@@ -17495,6 +18022,13 @@
   <p:clrMapOvr>
     <a:masterClrMapping/>
   </p:clrMapOvr>
+  <p:timing>
+    <p:tnLst>
+      <p:par>
+        <p:cTn id="1" dur="indefinite" restart="never" nodeType="tmRoot"/>
+      </p:par>
+    </p:tnLst>
+  </p:timing>
 </p:sld>
 </file>
 
@@ -17599,6 +18133,13 @@
   <p:clrMapOvr>
     <a:masterClrMapping/>
   </p:clrMapOvr>
+  <p:timing>
+    <p:tnLst>
+      <p:par>
+        <p:cTn id="1" dur="indefinite" restart="never" nodeType="tmRoot"/>
+      </p:par>
+    </p:tnLst>
+  </p:timing>
 </p:sld>
 </file>
 
@@ -18712,6 +19253,13 @@
       </p:transition>
     </mc:Fallback>
   </mc:AlternateContent>
+  <p:timing>
+    <p:tnLst>
+      <p:par>
+        <p:cTn id="1" dur="indefinite" restart="never" nodeType="tmRoot"/>
+      </p:par>
+    </p:tnLst>
+  </p:timing>
 </p:sld>
 </file>
 
@@ -20446,6 +20994,13 @@
   <p:clrMapOvr>
     <a:masterClrMapping/>
   </p:clrMapOvr>
+  <p:timing>
+    <p:tnLst>
+      <p:par>
+        <p:cTn id="1" dur="indefinite" restart="never" nodeType="tmRoot"/>
+      </p:par>
+    </p:tnLst>
+  </p:timing>
 </p:sld>
 </file>
 
@@ -20566,13 +21121,8 @@
             </a:r>
             <a:r>
               <a:rPr lang="de-DE" dirty="0"/>
-              <a:t> als API für verschiedene Systeme </a:t>
-            </a:r>
-            <a:r>
-              <a:rPr lang="de-DE"/>
-              <a:t>sehr praktisch</a:t>
-            </a:r>
-            <a:endParaRPr lang="de-DE" dirty="0"/>
+              <a:t> als API für verschiedene Systeme sehr praktisch</a:t>
+            </a:r>
           </a:p>
         </p:txBody>
       </p:sp>
@@ -20586,6 +21136,13 @@
   <p:clrMapOvr>
     <a:masterClrMapping/>
   </p:clrMapOvr>
+  <p:timing>
+    <p:tnLst>
+      <p:par>
+        <p:cTn id="1" dur="indefinite" restart="never" nodeType="tmRoot"/>
+      </p:par>
+    </p:tnLst>
+  </p:timing>
 </p:sld>
 </file>
 
@@ -20672,6 +21229,13 @@
   <p:clrMapOvr>
     <a:masterClrMapping/>
   </p:clrMapOvr>
+  <p:timing>
+    <p:tnLst>
+      <p:par>
+        <p:cTn id="1" dur="indefinite" restart="never" nodeType="tmRoot"/>
+      </p:par>
+    </p:tnLst>
+  </p:timing>
 </p:sld>
 </file>
 
@@ -20926,6 +21490,13 @@
       </p:transition>
     </mc:Fallback>
   </mc:AlternateContent>
+  <p:timing>
+    <p:tnLst>
+      <p:par>
+        <p:cTn id="1" dur="indefinite" restart="never" nodeType="tmRoot"/>
+      </p:par>
+    </p:tnLst>
+  </p:timing>
 </p:sld>
 </file>
 

</xml_diff>